<commit_message>
Add New UI inthe ppt
</commit_message>
<xml_diff>
--- a/PATCH VALIDATION TOOL.pptx
+++ b/PATCH VALIDATION TOOL.pptx
@@ -265,7 +265,7 @@
           <a:p>
             <a:fld id="{5F5B2A1F-23C1-4E27-9F6C-38EF436E80B0}" type="datetimeFigureOut">
               <a:rPr lang="en-US" smtClean="0"/>
-              <a:t>6/4/2020</a:t>
+              <a:t>7/21/2020</a:t>
             </a:fld>
             <a:endParaRPr lang="en-US"/>
           </a:p>
@@ -463,7 +463,7 @@
           <a:p>
             <a:fld id="{5F5B2A1F-23C1-4E27-9F6C-38EF436E80B0}" type="datetimeFigureOut">
               <a:rPr lang="en-US" smtClean="0"/>
-              <a:t>6/4/2020</a:t>
+              <a:t>7/21/2020</a:t>
             </a:fld>
             <a:endParaRPr lang="en-US"/>
           </a:p>
@@ -671,7 +671,7 @@
           <a:p>
             <a:fld id="{5F5B2A1F-23C1-4E27-9F6C-38EF436E80B0}" type="datetimeFigureOut">
               <a:rPr lang="en-US" smtClean="0"/>
-              <a:t>6/4/2020</a:t>
+              <a:t>7/21/2020</a:t>
             </a:fld>
             <a:endParaRPr lang="en-US"/>
           </a:p>
@@ -869,7 +869,7 @@
           <a:p>
             <a:fld id="{5F5B2A1F-23C1-4E27-9F6C-38EF436E80B0}" type="datetimeFigureOut">
               <a:rPr lang="en-US" smtClean="0"/>
-              <a:t>6/4/2020</a:t>
+              <a:t>7/21/2020</a:t>
             </a:fld>
             <a:endParaRPr lang="en-US"/>
           </a:p>
@@ -1144,7 +1144,7 @@
           <a:p>
             <a:fld id="{5F5B2A1F-23C1-4E27-9F6C-38EF436E80B0}" type="datetimeFigureOut">
               <a:rPr lang="en-US" smtClean="0"/>
-              <a:t>6/4/2020</a:t>
+              <a:t>7/21/2020</a:t>
             </a:fld>
             <a:endParaRPr lang="en-US"/>
           </a:p>
@@ -1409,7 +1409,7 @@
           <a:p>
             <a:fld id="{5F5B2A1F-23C1-4E27-9F6C-38EF436E80B0}" type="datetimeFigureOut">
               <a:rPr lang="en-US" smtClean="0"/>
-              <a:t>6/4/2020</a:t>
+              <a:t>7/21/2020</a:t>
             </a:fld>
             <a:endParaRPr lang="en-US"/>
           </a:p>
@@ -1821,7 +1821,7 @@
           <a:p>
             <a:fld id="{5F5B2A1F-23C1-4E27-9F6C-38EF436E80B0}" type="datetimeFigureOut">
               <a:rPr lang="en-US" smtClean="0"/>
-              <a:t>6/4/2020</a:t>
+              <a:t>7/21/2020</a:t>
             </a:fld>
             <a:endParaRPr lang="en-US"/>
           </a:p>
@@ -1962,7 +1962,7 @@
           <a:p>
             <a:fld id="{5F5B2A1F-23C1-4E27-9F6C-38EF436E80B0}" type="datetimeFigureOut">
               <a:rPr lang="en-US" smtClean="0"/>
-              <a:t>6/4/2020</a:t>
+              <a:t>7/21/2020</a:t>
             </a:fld>
             <a:endParaRPr lang="en-US"/>
           </a:p>
@@ -2075,7 +2075,7 @@
           <a:p>
             <a:fld id="{5F5B2A1F-23C1-4E27-9F6C-38EF436E80B0}" type="datetimeFigureOut">
               <a:rPr lang="en-US" smtClean="0"/>
-              <a:t>6/4/2020</a:t>
+              <a:t>7/21/2020</a:t>
             </a:fld>
             <a:endParaRPr lang="en-US"/>
           </a:p>
@@ -2386,7 +2386,7 @@
           <a:p>
             <a:fld id="{5F5B2A1F-23C1-4E27-9F6C-38EF436E80B0}" type="datetimeFigureOut">
               <a:rPr lang="en-US" smtClean="0"/>
-              <a:t>6/4/2020</a:t>
+              <a:t>7/21/2020</a:t>
             </a:fld>
             <a:endParaRPr lang="en-US"/>
           </a:p>
@@ -2677,7 +2677,7 @@
           <a:p>
             <a:fld id="{5F5B2A1F-23C1-4E27-9F6C-38EF436E80B0}" type="datetimeFigureOut">
               <a:rPr lang="en-US" smtClean="0"/>
-              <a:t>6/4/2020</a:t>
+              <a:t>7/21/2020</a:t>
             </a:fld>
             <a:endParaRPr lang="en-US"/>
           </a:p>
@@ -2918,7 +2918,7 @@
           <a:p>
             <a:fld id="{5F5B2A1F-23C1-4E27-9F6C-38EF436E80B0}" type="datetimeFigureOut">
               <a:rPr lang="en-US" smtClean="0"/>
-              <a:t>6/4/2020</a:t>
+              <a:t>7/21/2020</a:t>
             </a:fld>
             <a:endParaRPr lang="en-US"/>
           </a:p>
@@ -3966,44 +3966,21 @@
           </a:p>
         </p:txBody>
       </p:sp>
-      <p:sp>
-        <p:nvSpPr>
-          <p:cNvPr id="6" name="Content Placeholder 5">
-            <a:extLst>
-              <a:ext uri="{FF2B5EF4-FFF2-40B4-BE49-F238E27FC236}">
-                <a16:creationId xmlns:a16="http://schemas.microsoft.com/office/drawing/2014/main" id="{B7461F74-8FE6-483B-AC4E-253A47A13B30}"/>
-              </a:ext>
-            </a:extLst>
-          </p:cNvPr>
-          <p:cNvSpPr>
-            <a:spLocks noGrp="1"/>
-          </p:cNvSpPr>
-          <p:nvPr>
-            <p:ph idx="1"/>
-          </p:nvPr>
-        </p:nvSpPr>
-        <p:spPr/>
-        <p:txBody>
-          <a:bodyPr/>
-          <a:lstStyle/>
-          <a:p>
-            <a:endParaRPr lang="en-US"/>
-          </a:p>
-        </p:txBody>
-      </p:sp>
       <p:pic>
         <p:nvPicPr>
-          <p:cNvPr id="7" name="Picture 6">
-            <a:extLst>
-              <a:ext uri="{FF2B5EF4-FFF2-40B4-BE49-F238E27FC236}">
-                <a16:creationId xmlns:a16="http://schemas.microsoft.com/office/drawing/2014/main" id="{BCB341A2-FE3A-4148-A559-BAACD00AD77C}"/>
+          <p:cNvPr id="4" name="Content Placeholder 3">
+            <a:extLst>
+              <a:ext uri="{FF2B5EF4-FFF2-40B4-BE49-F238E27FC236}">
+                <a16:creationId xmlns:a16="http://schemas.microsoft.com/office/drawing/2014/main" id="{F86AC226-EBE5-4C23-BE63-E4985B45AB00}"/>
               </a:ext>
             </a:extLst>
           </p:cNvPr>
           <p:cNvPicPr>
-            <a:picLocks noChangeAspect="1"/>
+            <a:picLocks noGrp="1" noChangeAspect="1"/>
           </p:cNvPicPr>
-          <p:nvPr/>
+          <p:nvPr>
+            <p:ph idx="1"/>
+          </p:nvPr>
         </p:nvPicPr>
         <p:blipFill>
           <a:blip r:embed="rId2"/>
@@ -4013,8 +3990,8 @@
         </p:blipFill>
         <p:spPr>
           <a:xfrm>
-            <a:off x="1304925" y="1825625"/>
-            <a:ext cx="9439275" cy="4351338"/>
+            <a:off x="1891101" y="1825625"/>
+            <a:ext cx="8409797" cy="4351338"/>
           </a:xfrm>
           <a:prstGeom prst="rect">
             <a:avLst/>
@@ -4424,6 +4401,21 @@
 </file>
 
 <file path=customXml/item1.xml><?xml version="1.0" encoding="utf-8"?>
+<?mso-contentType ?>
+<FormTemplates xmlns="http://schemas.microsoft.com/sharepoint/v3/contenttype/forms">
+  <Display>DocumentLibraryForm</Display>
+  <Edit>DocumentLibraryForm</Edit>
+  <New>DocumentLibraryForm</New>
+</FormTemplates>
+</file>
+
+<file path=customXml/item2.xml><?xml version="1.0" encoding="utf-8"?>
+<p:properties xmlns:p="http://schemas.microsoft.com/office/2006/metadata/properties" xmlns:xsi="http://www.w3.org/2001/XMLSchema-instance" xmlns:pc="http://schemas.microsoft.com/office/infopath/2007/PartnerControls">
+  <documentManagement/>
+</p:properties>
+</file>
+
+<file path=customXml/item3.xml><?xml version="1.0" encoding="utf-8"?>
 <ct:contentTypeSchema xmlns:ct="http://schemas.microsoft.com/office/2006/metadata/contentType" xmlns:ma="http://schemas.microsoft.com/office/2006/metadata/properties/metaAttributes" ct:_="" ma:_="" ma:contentTypeName="Document" ma:contentTypeID="0x010100F68E4CDA1132954EA66E7CC9CE39C5CB" ma:contentTypeVersion="0" ma:contentTypeDescription="Create a new document." ma:contentTypeScope="" ma:versionID="f041f54bf4bfe06f7e4683fed34141f5">
   <xsd:schema xmlns:xsd="http://www.w3.org/2001/XMLSchema" xmlns:xs="http://www.w3.org/2001/XMLSchema" xmlns:p="http://schemas.microsoft.com/office/2006/metadata/properties" targetNamespace="http://schemas.microsoft.com/office/2006/metadata/properties" ma:root="true" ma:fieldsID="5173ff60f10a57dad6eaf482ff2fc43c">
     <xsd:element name="properties">
@@ -4537,33 +4529,10 @@
 </ct:contentTypeSchema>
 </file>
 
-<file path=customXml/item2.xml><?xml version="1.0" encoding="utf-8"?>
-<p:properties xmlns:p="http://schemas.microsoft.com/office/2006/metadata/properties" xmlns:xsi="http://www.w3.org/2001/XMLSchema-instance" xmlns:pc="http://schemas.microsoft.com/office/infopath/2007/PartnerControls">
-  <documentManagement/>
-</p:properties>
-</file>
-
-<file path=customXml/item3.xml><?xml version="1.0" encoding="utf-8"?>
-<?mso-contentType ?>
-<FormTemplates xmlns="http://schemas.microsoft.com/sharepoint/v3/contenttype/forms">
-  <Display>DocumentLibraryForm</Display>
-  <Edit>DocumentLibraryForm</Edit>
-  <New>DocumentLibraryForm</New>
-</FormTemplates>
-</file>
-
 <file path=customXml/itemProps1.xml><?xml version="1.0" encoding="utf-8"?>
-<ds:datastoreItem xmlns:ds="http://schemas.openxmlformats.org/officeDocument/2006/customXml" ds:itemID="{4CF6DC6C-4E2F-4DAB-9316-0AF2274A4C50}">
+<ds:datastoreItem xmlns:ds="http://schemas.openxmlformats.org/officeDocument/2006/customXml" ds:itemID="{00465275-B123-488D-A4FF-7FDD54A056E5}">
   <ds:schemaRefs>
-    <ds:schemaRef ds:uri="http://schemas.microsoft.com/office/2006/metadata/contentType"/>
-    <ds:schemaRef ds:uri="http://schemas.microsoft.com/office/2006/metadata/properties/metaAttributes"/>
-    <ds:schemaRef ds:uri="http://www.w3.org/2001/XMLSchema"/>
-    <ds:schemaRef ds:uri="http://schemas.microsoft.com/office/2006/metadata/properties"/>
-    <ds:schemaRef ds:uri="http://schemas.openxmlformats.org/package/2006/metadata/core-properties"/>
-    <ds:schemaRef ds:uri="http://purl.org/dc/elements/1.1/"/>
-    <ds:schemaRef ds:uri="http://purl.org/dc/terms/"/>
-    <ds:schemaRef ds:uri="http://schemas.microsoft.com/internal/obd"/>
-    <ds:schemaRef ds:uri="http://schemas.microsoft.com/office/infopath/2007/PartnerControls"/>
+    <ds:schemaRef ds:uri="http://schemas.microsoft.com/sharepoint/v3/contenttype/forms"/>
   </ds:schemaRefs>
 </ds:datastoreItem>
 </file>
@@ -4584,9 +4553,17 @@
 </file>
 
 <file path=customXml/itemProps3.xml><?xml version="1.0" encoding="utf-8"?>
-<ds:datastoreItem xmlns:ds="http://schemas.openxmlformats.org/officeDocument/2006/customXml" ds:itemID="{00465275-B123-488D-A4FF-7FDD54A056E5}">
+<ds:datastoreItem xmlns:ds="http://schemas.openxmlformats.org/officeDocument/2006/customXml" ds:itemID="{4CF6DC6C-4E2F-4DAB-9316-0AF2274A4C50}">
   <ds:schemaRefs>
-    <ds:schemaRef ds:uri="http://schemas.microsoft.com/sharepoint/v3/contenttype/forms"/>
+    <ds:schemaRef ds:uri="http://schemas.microsoft.com/office/2006/metadata/contentType"/>
+    <ds:schemaRef ds:uri="http://schemas.microsoft.com/office/2006/metadata/properties/metaAttributes"/>
+    <ds:schemaRef ds:uri="http://www.w3.org/2001/XMLSchema"/>
+    <ds:schemaRef ds:uri="http://schemas.microsoft.com/office/2006/metadata/properties"/>
+    <ds:schemaRef ds:uri="http://schemas.openxmlformats.org/package/2006/metadata/core-properties"/>
+    <ds:schemaRef ds:uri="http://purl.org/dc/elements/1.1/"/>
+    <ds:schemaRef ds:uri="http://purl.org/dc/terms/"/>
+    <ds:schemaRef ds:uri="http://schemas.microsoft.com/internal/obd"/>
+    <ds:schemaRef ds:uri="http://schemas.microsoft.com/office/infopath/2007/PartnerControls"/>
   </ds:schemaRefs>
 </ds:datastoreItem>
 </file>
</xml_diff>